<commit_message>
Changed business names from YPS - Bridge Mobile Phils., Inc.
</commit_message>
<xml_diff>
--- a/YPS.pptx
+++ b/YPS.pptx
@@ -112,6 +112,11 @@
       </a:defRPr>
     </a:lvl9pPr>
   </p:defaultTextStyle>
+  <p:extLst>
+    <p:ext uri="{EFAFB233-063F-42B5-8137-9DF3F51BA10A}">
+      <p15:sldGuideLst xmlns:p15="http://schemas.microsoft.com/office/powerpoint/2012/main"/>
+    </p:ext>
+  </p:extLst>
 </p:presentation>
 </file>
 
@@ -4272,6 +4277,28 @@
           <a:bodyPr/>
           <a:lstStyle/>
           <a:p>
+            <a:r>
+              <a:rPr lang="en-SG" dirty="0" smtClean="0"/>
+              <a:t>Bridge Mobile </a:t>
+            </a:r>
+            <a:r>
+              <a:rPr lang="en-SG" dirty="0" err="1" smtClean="0"/>
+              <a:t>Phils</a:t>
+            </a:r>
+            <a:r>
+              <a:rPr lang="en-SG" smtClean="0"/>
+              <a:t>., </a:t>
+            </a:r>
+            <a:r>
+              <a:rPr lang="en-SG" dirty="0" smtClean="0"/>
+              <a:t>Inc</a:t>
+            </a:r>
+            <a:r>
+              <a:rPr lang="en-SG" dirty="0" smtClean="0"/>
+              <a:t>.</a:t>
+            </a:r>
+          </a:p>
+          <a:p>
             <a:endParaRPr lang="en-SG" dirty="0"/>
           </a:p>
         </p:txBody>
@@ -4286,13 +4313,13 @@
   <p:clrMapOvr>
     <a:masterClrMapping/>
   </p:clrMapOvr>
-  <mc:AlternateContent xmlns:mc="http://schemas.openxmlformats.org/markup-compatibility/2006">
-    <mc:Choice xmlns:p15="http://schemas.microsoft.com/office/powerpoint/2012/main" Requires="p15">
+  <mc:AlternateContent xmlns:mc="http://schemas.openxmlformats.org/markup-compatibility/2006" xmlns:p15="http://schemas.microsoft.com/office/powerpoint/2012/main">
+    <mc:Choice Requires="p15">
       <p:transition xmlns:p14="http://schemas.microsoft.com/office/powerpoint/2010/main" spd="slow" p14:dur="2000">
         <p15:prstTrans prst="drape"/>
       </p:transition>
     </mc:Choice>
-    <mc:Fallback>
+    <mc:Fallback xmlns="">
       <p:transition spd="slow">
         <p:fade/>
       </p:transition>
@@ -4434,13 +4461,13 @@
   <p:clrMapOvr>
     <a:masterClrMapping/>
   </p:clrMapOvr>
-  <mc:AlternateContent xmlns:mc="http://schemas.openxmlformats.org/markup-compatibility/2006">
-    <mc:Choice xmlns:p14="http://schemas.microsoft.com/office/powerpoint/2010/main" Requires="p14">
+  <mc:AlternateContent xmlns:mc="http://schemas.openxmlformats.org/markup-compatibility/2006" xmlns:p14="http://schemas.microsoft.com/office/powerpoint/2010/main">
+    <mc:Choice Requires="p14">
       <p:transition spd="slow" p14:dur="1500">
         <p:split orient="vert"/>
       </p:transition>
     </mc:Choice>
-    <mc:Fallback>
+    <mc:Fallback xmlns="">
       <p:transition spd="slow">
         <p:split orient="vert"/>
       </p:transition>
@@ -4583,13 +4610,13 @@
   <p:clrMapOvr>
     <a:masterClrMapping/>
   </p:clrMapOvr>
-  <mc:AlternateContent xmlns:mc="http://schemas.openxmlformats.org/markup-compatibility/2006">
-    <mc:Choice xmlns:p15="http://schemas.microsoft.com/office/powerpoint/2012/main" Requires="p15">
+  <mc:AlternateContent xmlns:mc="http://schemas.openxmlformats.org/markup-compatibility/2006" xmlns:p15="http://schemas.microsoft.com/office/powerpoint/2012/main">
+    <mc:Choice Requires="p15">
       <p:transition xmlns:p14="http://schemas.microsoft.com/office/powerpoint/2010/main" spd="slow" p14:dur="2000">
         <p15:prstTrans prst="crush"/>
       </p:transition>
     </mc:Choice>
-    <mc:Fallback>
+    <mc:Fallback xmlns="">
       <p:transition spd="slow">
         <p:fade/>
       </p:transition>
@@ -4869,13 +4896,13 @@
   <p:clrMapOvr>
     <a:masterClrMapping/>
   </p:clrMapOvr>
-  <mc:AlternateContent xmlns:mc="http://schemas.openxmlformats.org/markup-compatibility/2006">
-    <mc:Choice xmlns:p15="http://schemas.microsoft.com/office/powerpoint/2012/main" Requires="p15">
+  <mc:AlternateContent xmlns:mc="http://schemas.openxmlformats.org/markup-compatibility/2006" xmlns:p15="http://schemas.microsoft.com/office/powerpoint/2012/main">
+    <mc:Choice Requires="p15">
       <p:transition xmlns:p14="http://schemas.microsoft.com/office/powerpoint/2010/main" spd="slow" p14:dur="2000">
         <p15:prstTrans prst="fracture"/>
       </p:transition>
     </mc:Choice>
-    <mc:Fallback>
+    <mc:Fallback xmlns="">
       <p:transition spd="slow">
         <p:fade/>
       </p:transition>
@@ -4993,13 +5020,13 @@
   <p:clrMapOvr>
     <a:masterClrMapping/>
   </p:clrMapOvr>
-  <mc:AlternateContent xmlns:mc="http://schemas.openxmlformats.org/markup-compatibility/2006">
-    <mc:Choice xmlns:p14="http://schemas.microsoft.com/office/powerpoint/2010/main" Requires="p14">
+  <mc:AlternateContent xmlns:mc="http://schemas.openxmlformats.org/markup-compatibility/2006" xmlns:p14="http://schemas.microsoft.com/office/powerpoint/2010/main">
+    <mc:Choice Requires="p14">
       <p:transition spd="slow" p14:dur="4000">
         <p14:vortex dir="r"/>
       </p:transition>
     </mc:Choice>
-    <mc:Fallback>
+    <mc:Fallback xmlns="">
       <p:transition spd="slow">
         <p:fade/>
       </p:transition>
@@ -5071,13 +5098,13 @@
   <p:clrMapOvr>
     <a:masterClrMapping/>
   </p:clrMapOvr>
-  <mc:AlternateContent xmlns:mc="http://schemas.openxmlformats.org/markup-compatibility/2006">
-    <mc:Choice xmlns:p14="http://schemas.microsoft.com/office/powerpoint/2010/main" Requires="p14">
+  <mc:AlternateContent xmlns:mc="http://schemas.openxmlformats.org/markup-compatibility/2006" xmlns:p14="http://schemas.microsoft.com/office/powerpoint/2010/main">
+    <mc:Choice Requires="p14">
       <p:transition spd="slow" p14:dur="900">
         <p14:warp dir="in"/>
       </p:transition>
     </mc:Choice>
-    <mc:Fallback>
+    <mc:Fallback xmlns="">
       <p:transition spd="slow">
         <p:fade/>
       </p:transition>
@@ -5149,13 +5176,13 @@
   <p:clrMapOvr>
     <a:masterClrMapping/>
   </p:clrMapOvr>
-  <mc:AlternateContent xmlns:mc="http://schemas.openxmlformats.org/markup-compatibility/2006">
-    <mc:Choice xmlns:p14="http://schemas.microsoft.com/office/powerpoint/2010/main" Requires="p14">
+  <mc:AlternateContent xmlns:mc="http://schemas.openxmlformats.org/markup-compatibility/2006" xmlns:p14="http://schemas.microsoft.com/office/powerpoint/2010/main">
+    <mc:Choice Requires="p14">
       <p:transition spd="slow" p14:dur="1200">
         <p14:prism/>
       </p:transition>
     </mc:Choice>
-    <mc:Fallback>
+    <mc:Fallback xmlns="">
       <p:transition spd="slow">
         <p:fade/>
       </p:transition>
@@ -5227,13 +5254,13 @@
   <p:clrMapOvr>
     <a:masterClrMapping/>
   </p:clrMapOvr>
-  <mc:AlternateContent xmlns:mc="http://schemas.openxmlformats.org/markup-compatibility/2006">
-    <mc:Choice xmlns:p14="http://schemas.microsoft.com/office/powerpoint/2010/main" Requires="p14">
+  <mc:AlternateContent xmlns:mc="http://schemas.openxmlformats.org/markup-compatibility/2006" xmlns:p14="http://schemas.microsoft.com/office/powerpoint/2010/main">
+    <mc:Choice Requires="p14">
       <p:transition spd="slow" p14:dur="1600">
         <p14:conveyor dir="l"/>
       </p:transition>
     </mc:Choice>
-    <mc:Fallback>
+    <mc:Fallback xmlns="">
       <p:transition spd="slow">
         <p:fade/>
       </p:transition>
@@ -5512,13 +5539,13 @@
   <p:clrMapOvr>
     <a:masterClrMapping/>
   </p:clrMapOvr>
-  <mc:AlternateContent xmlns:mc="http://schemas.openxmlformats.org/markup-compatibility/2006">
-    <mc:Choice xmlns:p14="http://schemas.microsoft.com/office/powerpoint/2010/main" Requires="p14">
+  <mc:AlternateContent xmlns:mc="http://schemas.openxmlformats.org/markup-compatibility/2006" xmlns:p14="http://schemas.microsoft.com/office/powerpoint/2010/main">
+    <mc:Choice Requires="p14">
       <p:transition spd="slow" p14:dur="2000">
         <p14:ferris dir="l"/>
       </p:transition>
     </mc:Choice>
-    <mc:Fallback>
+    <mc:Fallback xmlns="">
       <p:transition spd="slow">
         <p:fade/>
       </p:transition>

</xml_diff>

<commit_message>
Added Screen shots of presentation
</commit_message>
<xml_diff>
--- a/YPS.pptx
+++ b/YPS.pptx
@@ -13,7 +13,8 @@
     <p:sldId id="261" r:id="rId7"/>
     <p:sldId id="262" r:id="rId8"/>
     <p:sldId id="263" r:id="rId9"/>
-    <p:sldId id="260" r:id="rId10"/>
+    <p:sldId id="266" r:id="rId10"/>
+    <p:sldId id="265" r:id="rId11"/>
   </p:sldIdLst>
   <p:sldSz cx="12192000" cy="6858000"/>
   <p:notesSz cx="6858000" cy="9144000"/>
@@ -4291,11 +4292,7 @@
             </a:r>
             <a:r>
               <a:rPr lang="en-SG" dirty="0" smtClean="0"/>
-              <a:t>Inc</a:t>
-            </a:r>
-            <a:r>
-              <a:rPr lang="en-SG" dirty="0" smtClean="0"/>
-              <a:t>.</a:t>
+              <a:t>Inc.</a:t>
             </a:r>
           </a:p>
           <a:p>
@@ -4320,6 +4317,142 @@
       </p:transition>
     </mc:Choice>
     <mc:Fallback xmlns="">
+      <p:transition spd="slow">
+        <p:fade/>
+      </p:transition>
+    </mc:Fallback>
+  </mc:AlternateContent>
+  <p:timing>
+    <p:tnLst>
+      <p:par>
+        <p:cTn id="1" dur="indefinite" restart="never" nodeType="tmRoot"/>
+      </p:par>
+    </p:tnLst>
+  </p:timing>
+</p:sld>
+</file>
+
+<file path=ppt/slides/slide10.xml><?xml version="1.0" encoding="utf-8"?>
+<p:sld xmlns:a="http://schemas.openxmlformats.org/drawingml/2006/main" xmlns:r="http://schemas.openxmlformats.org/officeDocument/2006/relationships" xmlns:p="http://schemas.openxmlformats.org/presentationml/2006/main">
+  <p:cSld>
+    <p:spTree>
+      <p:nvGrpSpPr>
+        <p:cNvPr id="1" name=""/>
+        <p:cNvGrpSpPr/>
+        <p:nvPr/>
+      </p:nvGrpSpPr>
+      <p:grpSpPr>
+        <a:xfrm>
+          <a:off x="0" y="0"/>
+          <a:ext cx="0" cy="0"/>
+          <a:chOff x="0" y="0"/>
+          <a:chExt cx="0" cy="0"/>
+        </a:xfrm>
+      </p:grpSpPr>
+      <p:sp>
+        <p:nvSpPr>
+          <p:cNvPr id="5" name="Title 4"/>
+          <p:cNvSpPr>
+            <a:spLocks noGrp="1"/>
+          </p:cNvSpPr>
+          <p:nvPr>
+            <p:ph type="title"/>
+          </p:nvPr>
+        </p:nvSpPr>
+        <p:spPr/>
+        <p:txBody>
+          <a:bodyPr/>
+          <a:lstStyle/>
+          <a:p>
+            <a:r>
+              <a:rPr lang="en-SG" dirty="0" smtClean="0"/>
+              <a:t>Return of Investment</a:t>
+            </a:r>
+            <a:endParaRPr lang="en-SG" dirty="0"/>
+          </a:p>
+        </p:txBody>
+      </p:sp>
+      <p:sp>
+        <p:nvSpPr>
+          <p:cNvPr id="6" name="Content Placeholder 5"/>
+          <p:cNvSpPr>
+            <a:spLocks noGrp="1"/>
+          </p:cNvSpPr>
+          <p:nvPr>
+            <p:ph idx="1"/>
+          </p:nvPr>
+        </p:nvSpPr>
+        <p:spPr/>
+        <p:txBody>
+          <a:bodyPr/>
+          <a:lstStyle/>
+          <a:p>
+            <a:pPr marL="0" indent="0">
+              <a:buNone/>
+            </a:pPr>
+            <a:r>
+              <a:rPr lang="en-SG" sz="2400" dirty="0"/>
+              <a:t>• Every download of free version of the application (Ads)</a:t>
+            </a:r>
+          </a:p>
+          <a:p>
+            <a:pPr marL="0" indent="0">
+              <a:buNone/>
+            </a:pPr>
+            <a:r>
+              <a:rPr lang="en-SG" sz="2400" dirty="0"/>
+              <a:t>• User’s monthly Subscription of Premium version of the application</a:t>
+            </a:r>
+          </a:p>
+          <a:p>
+            <a:pPr marL="0" indent="0">
+              <a:buNone/>
+            </a:pPr>
+            <a:r>
+              <a:rPr lang="en-SG" sz="2400" dirty="0"/>
+              <a:t>• Yearly Membership of the Clothing Brands</a:t>
+            </a:r>
+          </a:p>
+          <a:p>
+            <a:pPr marL="0" indent="0">
+              <a:buNone/>
+            </a:pPr>
+            <a:r>
+              <a:rPr lang="en-SG" sz="2400" dirty="0"/>
+              <a:t>• Clothing Brands Advertisements of their featured product (per item)</a:t>
+            </a:r>
+          </a:p>
+          <a:p>
+            <a:pPr marL="0" indent="0">
+              <a:buNone/>
+            </a:pPr>
+            <a:r>
+              <a:rPr lang="en-SG" sz="2400" dirty="0"/>
+              <a:t>• User’s subscription of Upgrade wardrobe capacity</a:t>
+            </a:r>
+          </a:p>
+          <a:p>
+            <a:endParaRPr lang="en-SG" dirty="0"/>
+          </a:p>
+        </p:txBody>
+      </p:sp>
+    </p:spTree>
+    <p:extLst>
+      <p:ext uri="{BB962C8B-B14F-4D97-AF65-F5344CB8AC3E}">
+        <p14:creationId xmlns:p14="http://schemas.microsoft.com/office/powerpoint/2010/main" val="527272984"/>
+      </p:ext>
+    </p:extLst>
+  </p:cSld>
+  <p:clrMapOvr>
+    <a:masterClrMapping/>
+  </p:clrMapOvr>
+  <mc:AlternateContent xmlns:mc="http://schemas.openxmlformats.org/markup-compatibility/2006">
+    <mc:Choice xmlns:p15="http://schemas.microsoft.com/office/powerpoint/2012/main" Requires="p15">
+      <p:transition xmlns:p14="http://schemas.microsoft.com/office/powerpoint/2010/main" spd="slow" p14:dur="2000">
+        <p15:prstTrans prst="prestige"/>
+      </p:transition>
+    </mc:Choice>
+    <mc:Fallback>
       <p:transition spd="slow">
         <p:fade/>
       </p:transition>
@@ -4786,14 +4919,16 @@
         </p:nvSpPr>
         <p:spPr/>
         <p:txBody>
-          <a:bodyPr/>
+          <a:bodyPr>
+            <a:normAutofit fontScale="90000"/>
+          </a:bodyPr>
           <a:lstStyle/>
           <a:p>
             <a:r>
-              <a:rPr lang="en-SG" dirty="0" smtClean="0"/>
-              <a:t>SOLUTION</a:t>
-            </a:r>
-            <a:endParaRPr lang="en-SG" dirty="0"/>
+              <a:rPr lang="en-SG" i="1" dirty="0" smtClean="0"/>
+              <a:t>FASHION at the TIP of YOUR FINGERS</a:t>
+            </a:r>
+            <a:endParaRPr lang="en-SG" i="1" dirty="0"/>
           </a:p>
         </p:txBody>
       </p:sp>
@@ -5310,7 +5445,7 @@
           <a:p>
             <a:r>
               <a:rPr lang="en-SG" dirty="0" smtClean="0"/>
-              <a:t>FINANCIAL ANALYSIS</a:t>
+              <a:t>Financial analysis</a:t>
             </a:r>
             <a:endParaRPr lang="en-SG" dirty="0"/>
           </a:p>
@@ -5318,234 +5453,40 @@
       </p:sp>
       <p:sp>
         <p:nvSpPr>
-          <p:cNvPr id="3" name="Content Placeholder 2"/>
-          <p:cNvSpPr>
-            <a:spLocks noGrp="1"/>
-          </p:cNvSpPr>
-          <p:nvPr>
-            <p:ph sz="half" idx="1"/>
+          <p:cNvPr id="3" name="Text Placeholder 2"/>
+          <p:cNvSpPr>
+            <a:spLocks noGrp="1"/>
+          </p:cNvSpPr>
+          <p:nvPr>
+            <p:ph type="body" idx="1"/>
           </p:nvPr>
         </p:nvSpPr>
         <p:spPr/>
         <p:txBody>
-          <a:bodyPr>
-            <a:normAutofit/>
-          </a:bodyPr>
+          <a:bodyPr/>
           <a:lstStyle/>
           <a:p>
-            <a:pPr lvl="0"/>
-            <a:r>
-              <a:rPr lang="en-PH" b="1" dirty="0"/>
-              <a:t>Capital Requirement</a:t>
-            </a:r>
-            <a:endParaRPr lang="en-SG" dirty="0"/>
-          </a:p>
-          <a:p>
-            <a:pPr lvl="1"/>
-            <a:r>
-              <a:rPr lang="en-PH" dirty="0"/>
-              <a:t>Individual contributions</a:t>
-            </a:r>
-            <a:endParaRPr lang="en-SG" dirty="0"/>
-          </a:p>
-          <a:p>
-            <a:pPr lvl="1"/>
-            <a:r>
-              <a:rPr lang="en-PH" dirty="0"/>
-              <a:t>Bank Loan</a:t>
-            </a:r>
-            <a:endParaRPr lang="en-SG" dirty="0"/>
-          </a:p>
-          <a:p>
-            <a:pPr lvl="2"/>
-            <a:r>
-              <a:rPr lang="en-PH" dirty="0" smtClean="0"/>
-              <a:t>Payables</a:t>
-            </a:r>
-            <a:endParaRPr lang="en-SG" dirty="0"/>
-          </a:p>
-          <a:p>
-            <a:pPr lvl="2"/>
-            <a:r>
-              <a:rPr lang="en-PH" dirty="0" smtClean="0"/>
-              <a:t>Interest</a:t>
-            </a:r>
-            <a:endParaRPr lang="en-SG" dirty="0"/>
-          </a:p>
-          <a:p>
-            <a:pPr lvl="0"/>
-            <a:r>
-              <a:rPr lang="en-PH" b="1" dirty="0"/>
-              <a:t>Sales Forecast</a:t>
-            </a:r>
-            <a:endParaRPr lang="en-SG" dirty="0"/>
-          </a:p>
-          <a:p>
-            <a:pPr lvl="1"/>
-            <a:r>
-              <a:rPr lang="en-PH" dirty="0"/>
-              <a:t>Sales during 1</a:t>
-            </a:r>
-            <a:r>
-              <a:rPr lang="en-PH" baseline="30000" dirty="0"/>
-              <a:t>st</a:t>
-            </a:r>
-            <a:r>
-              <a:rPr lang="en-PH" dirty="0"/>
-              <a:t> Year</a:t>
-            </a:r>
-            <a:endParaRPr lang="en-SG" dirty="0"/>
-          </a:p>
-          <a:p>
-            <a:pPr lvl="0"/>
-            <a:r>
-              <a:rPr lang="en-PH" b="1" dirty="0"/>
-              <a:t>Estimated Profit (4 Years)</a:t>
-            </a:r>
-            <a:endParaRPr lang="en-SG" dirty="0"/>
-          </a:p>
-          <a:p>
-            <a:pPr lvl="1"/>
-            <a:r>
-              <a:rPr lang="en-PH" dirty="0"/>
-              <a:t>1</a:t>
-            </a:r>
-            <a:r>
-              <a:rPr lang="en-PH" baseline="30000" dirty="0"/>
-              <a:t>st</a:t>
-            </a:r>
-            <a:r>
-              <a:rPr lang="en-PH" dirty="0"/>
-              <a:t> and 2</a:t>
-            </a:r>
-            <a:r>
-              <a:rPr lang="en-PH" baseline="30000" dirty="0"/>
-              <a:t>nd</a:t>
-            </a:r>
-            <a:r>
-              <a:rPr lang="en-PH" dirty="0"/>
-              <a:t> Year</a:t>
-            </a:r>
-            <a:endParaRPr lang="en-SG" dirty="0"/>
-          </a:p>
-          <a:p>
-            <a:pPr lvl="1"/>
-            <a:r>
-              <a:rPr lang="en-PH" dirty="0"/>
-              <a:t>3</a:t>
-            </a:r>
-            <a:r>
-              <a:rPr lang="en-PH" baseline="30000" dirty="0"/>
-              <a:t>rd</a:t>
-            </a:r>
-            <a:r>
-              <a:rPr lang="en-PH" dirty="0"/>
-              <a:t> and 4</a:t>
-            </a:r>
-            <a:r>
-              <a:rPr lang="en-PH" baseline="30000" dirty="0"/>
-              <a:t>th</a:t>
-            </a:r>
-            <a:r>
-              <a:rPr lang="en-PH" dirty="0"/>
-              <a:t> Year</a:t>
-            </a:r>
-            <a:endParaRPr lang="en-SG" dirty="0"/>
-          </a:p>
-          <a:p>
-            <a:pPr lvl="1"/>
-            <a:r>
-              <a:rPr lang="en-PH" dirty="0"/>
-              <a:t>Differences (Growth? Relapse?)</a:t>
-            </a:r>
-            <a:endParaRPr lang="en-SG" dirty="0"/>
-          </a:p>
-          <a:p>
-            <a:pPr marL="0" indent="0">
-              <a:buNone/>
-            </a:pPr>
-            <a:endParaRPr lang="en-SG" dirty="0"/>
-          </a:p>
-        </p:txBody>
-      </p:sp>
-      <p:sp>
-        <p:nvSpPr>
-          <p:cNvPr id="4" name="Content Placeholder 3"/>
-          <p:cNvSpPr>
-            <a:spLocks noGrp="1"/>
-          </p:cNvSpPr>
-          <p:nvPr>
-            <p:ph sz="half" idx="2"/>
-          </p:nvPr>
-        </p:nvSpPr>
-        <p:spPr/>
-        <p:txBody>
-          <a:bodyPr>
-            <a:normAutofit/>
-          </a:bodyPr>
-          <a:lstStyle/>
-          <a:p>
-            <a:pPr lvl="0"/>
-            <a:r>
-              <a:rPr lang="en-PH" b="1" dirty="0"/>
-              <a:t>Estimated Expenses (4 Years)</a:t>
-            </a:r>
-            <a:endParaRPr lang="en-SG" dirty="0"/>
-          </a:p>
-          <a:p>
-            <a:pPr lvl="1"/>
-            <a:r>
-              <a:rPr lang="en-PH" dirty="0"/>
-              <a:t>Payable for How many Years?</a:t>
-            </a:r>
-            <a:endParaRPr lang="en-SG" dirty="0"/>
-          </a:p>
-          <a:p>
-            <a:pPr lvl="1"/>
-            <a:r>
-              <a:rPr lang="en-PH" dirty="0"/>
-              <a:t>Recovery from Expenses?</a:t>
-            </a:r>
-            <a:endParaRPr lang="en-SG" dirty="0"/>
-          </a:p>
-          <a:p>
-            <a:pPr lvl="0"/>
-            <a:r>
-              <a:rPr lang="en-PH" b="1" dirty="0"/>
-              <a:t>Revenue / Return of Investment</a:t>
-            </a:r>
-            <a:endParaRPr lang="en-SG" dirty="0"/>
-          </a:p>
-          <a:p>
-            <a:pPr lvl="1"/>
-            <a:r>
-              <a:rPr lang="en-PH" b="1" dirty="0"/>
-              <a:t>Should I invest? Why?</a:t>
-            </a:r>
-            <a:endParaRPr lang="en-SG" dirty="0"/>
-          </a:p>
-          <a:p>
-            <a:endParaRPr lang="en-SG" dirty="0"/>
+            <a:endParaRPr lang="en-SG"/>
           </a:p>
         </p:txBody>
       </p:sp>
     </p:spTree>
     <p:extLst>
       <p:ext uri="{BB962C8B-B14F-4D97-AF65-F5344CB8AC3E}">
-        <p14:creationId xmlns:p14="http://schemas.microsoft.com/office/powerpoint/2010/main" val="3187063108"/>
+        <p14:creationId xmlns:p14="http://schemas.microsoft.com/office/powerpoint/2010/main" val="3202579944"/>
       </p:ext>
     </p:extLst>
   </p:cSld>
   <p:clrMapOvr>
     <a:masterClrMapping/>
   </p:clrMapOvr>
-  <mc:AlternateContent xmlns:mc="http://schemas.openxmlformats.org/markup-compatibility/2006" xmlns:p14="http://schemas.microsoft.com/office/powerpoint/2010/main">
-    <mc:Choice Requires="p14">
-      <p:transition spd="slow" p14:dur="2000">
-        <p14:ferris dir="l"/>
+  <mc:AlternateContent xmlns:mc="http://schemas.openxmlformats.org/markup-compatibility/2006">
+    <mc:Choice xmlns:p14="http://schemas.microsoft.com/office/powerpoint/2010/main" Requires="p14">
+      <p:transition spd="slow" p14:dur="1300">
+        <p14:pan dir="u"/>
       </p:transition>
     </mc:Choice>
-    <mc:Fallback xmlns="">
+    <mc:Fallback>
       <p:transition spd="slow">
         <p:fade/>
       </p:transition>

</xml_diff>